<commit_message>
PPT with name removed
</commit_message>
<xml_diff>
--- a/Online+Car+Dealer+System.pptx
+++ b/Online+Car+Dealer+System.pptx
@@ -357,7 +357,7 @@
     </p:spTree>
     <p:extLst>
       <p:ext uri="{BB962C8B-B14F-4D97-AF65-F5344CB8AC3E}">
-        <p14:creationId xmlns:p14="http://schemas.microsoft.com/office/powerpoint/2010/main" xmlns="" val="1279415240"/>
+        <p14:creationId xmlns:p14="http://schemas.microsoft.com/office/powerpoint/2010/main" val="1279415240"/>
       </p:ext>
     </p:extLst>
   </p:cSld>
@@ -529,7 +529,7 @@
     </p:spTree>
     <p:extLst>
       <p:ext uri="{BB962C8B-B14F-4D97-AF65-F5344CB8AC3E}">
-        <p14:creationId xmlns:p14="http://schemas.microsoft.com/office/powerpoint/2010/main" xmlns="" val="2697128604"/>
+        <p14:creationId xmlns:p14="http://schemas.microsoft.com/office/powerpoint/2010/main" val="2697128604"/>
       </p:ext>
     </p:extLst>
   </p:cSld>
@@ -711,7 +711,7 @@
     </p:spTree>
     <p:extLst>
       <p:ext uri="{BB962C8B-B14F-4D97-AF65-F5344CB8AC3E}">
-        <p14:creationId xmlns:p14="http://schemas.microsoft.com/office/powerpoint/2010/main" xmlns="" val="2205083904"/>
+        <p14:creationId xmlns:p14="http://schemas.microsoft.com/office/powerpoint/2010/main" val="2205083904"/>
       </p:ext>
     </p:extLst>
   </p:cSld>
@@ -883,7 +883,7 @@
     </p:spTree>
     <p:extLst>
       <p:ext uri="{BB962C8B-B14F-4D97-AF65-F5344CB8AC3E}">
-        <p14:creationId xmlns:p14="http://schemas.microsoft.com/office/powerpoint/2010/main" xmlns="" val="1925561068"/>
+        <p14:creationId xmlns:p14="http://schemas.microsoft.com/office/powerpoint/2010/main" val="1925561068"/>
       </p:ext>
     </p:extLst>
   </p:cSld>
@@ -1131,7 +1131,7 @@
     </p:spTree>
     <p:extLst>
       <p:ext uri="{BB962C8B-B14F-4D97-AF65-F5344CB8AC3E}">
-        <p14:creationId xmlns:p14="http://schemas.microsoft.com/office/powerpoint/2010/main" xmlns="" val="3494111062"/>
+        <p14:creationId xmlns:p14="http://schemas.microsoft.com/office/powerpoint/2010/main" val="3494111062"/>
       </p:ext>
     </p:extLst>
   </p:cSld>
@@ -1421,7 +1421,7 @@
     </p:spTree>
     <p:extLst>
       <p:ext uri="{BB962C8B-B14F-4D97-AF65-F5344CB8AC3E}">
-        <p14:creationId xmlns:p14="http://schemas.microsoft.com/office/powerpoint/2010/main" xmlns="" val="1975756522"/>
+        <p14:creationId xmlns:p14="http://schemas.microsoft.com/office/powerpoint/2010/main" val="1975756522"/>
       </p:ext>
     </p:extLst>
   </p:cSld>
@@ -1845,7 +1845,7 @@
     </p:spTree>
     <p:extLst>
       <p:ext uri="{BB962C8B-B14F-4D97-AF65-F5344CB8AC3E}">
-        <p14:creationId xmlns:p14="http://schemas.microsoft.com/office/powerpoint/2010/main" xmlns="" val="3874859315"/>
+        <p14:creationId xmlns:p14="http://schemas.microsoft.com/office/powerpoint/2010/main" val="3874859315"/>
       </p:ext>
     </p:extLst>
   </p:cSld>
@@ -1965,7 +1965,7 @@
     </p:spTree>
     <p:extLst>
       <p:ext uri="{BB962C8B-B14F-4D97-AF65-F5344CB8AC3E}">
-        <p14:creationId xmlns:p14="http://schemas.microsoft.com/office/powerpoint/2010/main" xmlns="" val="2919489863"/>
+        <p14:creationId xmlns:p14="http://schemas.microsoft.com/office/powerpoint/2010/main" val="2919489863"/>
       </p:ext>
     </p:extLst>
   </p:cSld>
@@ -2062,7 +2062,7 @@
     </p:spTree>
     <p:extLst>
       <p:ext uri="{BB962C8B-B14F-4D97-AF65-F5344CB8AC3E}">
-        <p14:creationId xmlns:p14="http://schemas.microsoft.com/office/powerpoint/2010/main" xmlns="" val="1167458238"/>
+        <p14:creationId xmlns:p14="http://schemas.microsoft.com/office/powerpoint/2010/main" val="1167458238"/>
       </p:ext>
     </p:extLst>
   </p:cSld>
@@ -2341,7 +2341,7 @@
     </p:spTree>
     <p:extLst>
       <p:ext uri="{BB962C8B-B14F-4D97-AF65-F5344CB8AC3E}">
-        <p14:creationId xmlns:p14="http://schemas.microsoft.com/office/powerpoint/2010/main" xmlns="" val="2811716044"/>
+        <p14:creationId xmlns:p14="http://schemas.microsoft.com/office/powerpoint/2010/main" val="2811716044"/>
       </p:ext>
     </p:extLst>
   </p:cSld>
@@ -2596,7 +2596,7 @@
     </p:spTree>
     <p:extLst>
       <p:ext uri="{BB962C8B-B14F-4D97-AF65-F5344CB8AC3E}">
-        <p14:creationId xmlns:p14="http://schemas.microsoft.com/office/powerpoint/2010/main" xmlns="" val="2356666417"/>
+        <p14:creationId xmlns:p14="http://schemas.microsoft.com/office/powerpoint/2010/main" val="2356666417"/>
       </p:ext>
     </p:extLst>
   </p:cSld>
@@ -2847,7 +2847,7 @@
     </p:spTree>
     <p:extLst>
       <p:ext uri="{BB962C8B-B14F-4D97-AF65-F5344CB8AC3E}">
-        <p14:creationId xmlns:p14="http://schemas.microsoft.com/office/powerpoint/2010/main" xmlns="" val="957811692"/>
+        <p14:creationId xmlns:p14="http://schemas.microsoft.com/office/powerpoint/2010/main" val="957811692"/>
       </p:ext>
     </p:extLst>
   </p:cSld>
@@ -3151,20 +3151,12 @@
           <a:lstStyle/>
           <a:p>
             <a:r>
-              <a:rPr lang="en-US" dirty="0" smtClean="0">
-                <a:solidFill>
-                  <a:srgbClr val="FF0000"/>
-                </a:solidFill>
-              </a:rPr>
-              <a:t>Johann</a:t>
-            </a:r>
-            <a:r>
-              <a:rPr lang="en-US" dirty="0" smtClean="0"/>
-              <a:t> </a:t>
-            </a:r>
-            <a:r>
               <a:rPr lang="en-US" b="1" dirty="0" smtClean="0"/>
-              <a:t>Online Car Dealer System</a:t>
+              <a:t>Online </a:t>
+            </a:r>
+            <a:r>
+              <a:rPr lang="en-US" b="1" dirty="0" smtClean="0"/>
+              <a:t>Car Dealer System</a:t>
             </a:r>
             <a:endParaRPr lang="en-US" b="1" dirty="0"/>
           </a:p>
@@ -3241,7 +3233,7 @@
     </p:spTree>
     <p:extLst>
       <p:ext uri="{BB962C8B-B14F-4D97-AF65-F5344CB8AC3E}">
-        <p14:creationId xmlns:p14="http://schemas.microsoft.com/office/powerpoint/2010/main" xmlns="" val="1079363708"/>
+        <p14:creationId xmlns:p14="http://schemas.microsoft.com/office/powerpoint/2010/main" val="1079363708"/>
       </p:ext>
     </p:extLst>
   </p:cSld>
@@ -3284,22 +3276,14 @@
           <a:lstStyle/>
           <a:p>
             <a:r>
-              <a:rPr lang="en-US" dirty="0">
-                <a:solidFill>
-                  <a:srgbClr val="FF0000"/>
-                </a:solidFill>
-              </a:rPr>
-              <a:t>Yang</a:t>
-            </a:r>
-            <a:r>
-              <a:rPr lang="en-US" dirty="0"/>
-              <a:t> Selected </a:t>
-            </a:r>
-            <a:r>
-              <a:rPr lang="en-US" dirty="0" smtClean="0"/>
+              <a:rPr lang="en-US" b="1" dirty="0" smtClean="0"/>
+              <a:t>Selected </a:t>
+            </a:r>
+            <a:r>
+              <a:rPr lang="en-US" b="1" dirty="0" smtClean="0"/>
               <a:t>Use Case 4</a:t>
             </a:r>
-            <a:endParaRPr lang="en-US" dirty="0"/>
+            <a:endParaRPr lang="en-US" b="1" dirty="0"/>
           </a:p>
         </p:txBody>
       </p:sp>
@@ -3367,13 +3351,8 @@
           <a:p>
             <a:r>
               <a:rPr lang="en-US" dirty="0" smtClean="0"/>
-              <a:t>Exit Condition: Admin </a:t>
-            </a:r>
-            <a:r>
-              <a:rPr lang="en-US" dirty="0" smtClean="0"/>
-              <a:t>updates a car information</a:t>
-            </a:r>
-            <a:endParaRPr lang="en-US" dirty="0" smtClean="0"/>
+              <a:t>Exit Condition: Admin updates a car information</a:t>
+            </a:r>
           </a:p>
           <a:p>
             <a:r>
@@ -3394,7 +3373,6 @@
               <a:rPr lang="en-US" dirty="0" smtClean="0"/>
               <a:t>Repeated Unique values</a:t>
             </a:r>
-            <a:endParaRPr lang="en-US" dirty="0" smtClean="0"/>
           </a:p>
           <a:p>
             <a:r>
@@ -3407,7 +3385,7 @@
     </p:spTree>
     <p:extLst>
       <p:ext uri="{BB962C8B-B14F-4D97-AF65-F5344CB8AC3E}">
-        <p14:creationId xmlns:p14="http://schemas.microsoft.com/office/powerpoint/2010/main" xmlns="" val="1731634201"/>
+        <p14:creationId xmlns:p14="http://schemas.microsoft.com/office/powerpoint/2010/main" val="1731634201"/>
       </p:ext>
     </p:extLst>
   </p:cSld>
@@ -3450,22 +3428,14 @@
           <a:lstStyle/>
           <a:p>
             <a:r>
-              <a:rPr lang="en-US" dirty="0" smtClean="0">
-                <a:solidFill>
-                  <a:srgbClr val="FF0000"/>
-                </a:solidFill>
-              </a:rPr>
-              <a:t>Roger </a:t>
-            </a:r>
-            <a:r>
-              <a:rPr lang="en-US" dirty="0" smtClean="0"/>
+              <a:rPr lang="en-US" b="1" dirty="0" smtClean="0"/>
               <a:t>Class </a:t>
             </a:r>
             <a:r>
-              <a:rPr lang="en-US" dirty="0" smtClean="0"/>
+              <a:rPr lang="en-US" b="1" dirty="0" smtClean="0"/>
               <a:t>Diagrams</a:t>
             </a:r>
-            <a:endParaRPr lang="en-US" dirty="0"/>
+            <a:endParaRPr lang="en-US" b="1" dirty="0"/>
           </a:p>
         </p:txBody>
       </p:sp>
@@ -3483,7 +3453,7 @@
           <a:blip r:embed="rId2">
             <a:extLst>
               <a:ext uri="{28A0092B-C50C-407E-A947-70E740481C1C}">
-                <a14:useLocalDpi xmlns:a14="http://schemas.microsoft.com/office/drawing/2010/main" xmlns="" val="0"/>
+                <a14:useLocalDpi xmlns:a14="http://schemas.microsoft.com/office/drawing/2010/main" val="0"/>
               </a:ext>
             </a:extLst>
           </a:blip>
@@ -3501,7 +3471,7 @@
     </p:spTree>
     <p:extLst>
       <p:ext uri="{BB962C8B-B14F-4D97-AF65-F5344CB8AC3E}">
-        <p14:creationId xmlns:p14="http://schemas.microsoft.com/office/powerpoint/2010/main" xmlns="" val="119344913"/>
+        <p14:creationId xmlns:p14="http://schemas.microsoft.com/office/powerpoint/2010/main" val="119344913"/>
       </p:ext>
     </p:extLst>
   </p:cSld>
@@ -3544,30 +3514,14 @@
           <a:lstStyle/>
           <a:p>
             <a:r>
-              <a:rPr lang="en-US" dirty="0" smtClean="0">
-                <a:solidFill>
-                  <a:srgbClr val="FF0000"/>
-                </a:solidFill>
-              </a:rPr>
-              <a:t>Roge</a:t>
-            </a:r>
-            <a:r>
-              <a:rPr lang="en-US" dirty="0" smtClean="0">
-                <a:solidFill>
-                  <a:srgbClr val="FF0000"/>
-                </a:solidFill>
-              </a:rPr>
-              <a:t>r </a:t>
-            </a:r>
-            <a:r>
-              <a:rPr lang="en-US" dirty="0" smtClean="0"/>
+              <a:rPr lang="en-US" b="1" dirty="0" smtClean="0"/>
               <a:t>Class </a:t>
             </a:r>
             <a:r>
-              <a:rPr lang="en-US" dirty="0" smtClean="0"/>
+              <a:rPr lang="en-US" b="1" dirty="0" smtClean="0"/>
               <a:t>Diagrams</a:t>
             </a:r>
-            <a:endParaRPr lang="en-US" dirty="0"/>
+            <a:endParaRPr lang="en-US" b="1" dirty="0"/>
           </a:p>
         </p:txBody>
       </p:sp>
@@ -3589,15 +3543,15 @@
         </p:blipFill>
         <p:spPr>
           <a:xfrm>
-            <a:off x="457199" y="1788840"/>
-            <a:ext cx="8695123" cy="4383360"/>
+            <a:off x="-76200" y="1788840"/>
+            <a:ext cx="9677399" cy="4611960"/>
           </a:xfrm>
         </p:spPr>
       </p:pic>
     </p:spTree>
     <p:extLst>
       <p:ext uri="{BB962C8B-B14F-4D97-AF65-F5344CB8AC3E}">
-        <p14:creationId xmlns:p14="http://schemas.microsoft.com/office/powerpoint/2010/main" xmlns="" val="3373920446"/>
+        <p14:creationId xmlns:p14="http://schemas.microsoft.com/office/powerpoint/2010/main" val="3373920446"/>
       </p:ext>
     </p:extLst>
   </p:cSld>
@@ -3640,22 +3594,14 @@
           <a:lstStyle/>
           <a:p>
             <a:r>
-              <a:rPr lang="en-US" dirty="0" smtClean="0">
-                <a:solidFill>
-                  <a:srgbClr val="FF0000"/>
-                </a:solidFill>
-              </a:rPr>
-              <a:t>Roger </a:t>
-            </a:r>
-            <a:r>
-              <a:rPr lang="en-US" dirty="0" smtClean="0"/>
+              <a:rPr lang="en-US" b="1" dirty="0" smtClean="0"/>
               <a:t>Class </a:t>
             </a:r>
             <a:r>
-              <a:rPr lang="en-US" dirty="0" smtClean="0"/>
+              <a:rPr lang="en-US" b="1" dirty="0" smtClean="0"/>
               <a:t>Diagrams</a:t>
             </a:r>
-            <a:endParaRPr lang="en-US" dirty="0"/>
+            <a:endParaRPr lang="en-US" b="1" dirty="0"/>
           </a:p>
         </p:txBody>
       </p:sp>
@@ -3676,8 +3622,8 @@
         </p:blipFill>
         <p:spPr bwMode="auto">
           <a:xfrm>
-            <a:off x="2486025" y="1190625"/>
-            <a:ext cx="6657975" cy="5667375"/>
+            <a:off x="533400" y="1190625"/>
+            <a:ext cx="8610601" cy="5667375"/>
           </a:xfrm>
           <a:prstGeom prst="rect">
             <a:avLst/>
@@ -3695,7 +3641,7 @@
     </p:spTree>
     <p:extLst>
       <p:ext uri="{BB962C8B-B14F-4D97-AF65-F5344CB8AC3E}">
-        <p14:creationId xmlns:p14="http://schemas.microsoft.com/office/powerpoint/2010/main" xmlns="" val="3373920446"/>
+        <p14:creationId xmlns:p14="http://schemas.microsoft.com/office/powerpoint/2010/main" val="3373920446"/>
       </p:ext>
     </p:extLst>
   </p:cSld>
@@ -3741,7 +3687,7 @@
         <p:spPr>
           <a:xfrm>
             <a:off x="0" y="1752600"/>
-            <a:ext cx="9208741" cy="4191000"/>
+            <a:ext cx="9208741" cy="5334000"/>
           </a:xfrm>
         </p:spPr>
       </p:pic>
@@ -3786,24 +3732,7 @@
               <a:defRPr/>
             </a:pPr>
             <a:r>
-              <a:rPr kumimoji="0" lang="en-US" sz="4400" b="0" i="0" u="none" strike="noStrike" kern="1200" cap="none" spc="0" normalizeH="0" baseline="0" noProof="0" dirty="0" smtClean="0">
-                <a:ln>
-                  <a:noFill/>
-                </a:ln>
-                <a:solidFill>
-                  <a:srgbClr val="FF0000"/>
-                </a:solidFill>
-                <a:effectLst/>
-                <a:uLnTx/>
-                <a:uFillTx/>
-                <a:latin typeface="+mj-lt"/>
-                <a:ea typeface="+mj-ea"/>
-                <a:cs typeface="+mj-cs"/>
-              </a:rPr>
-              <a:t>Roger </a:t>
-            </a:r>
-            <a:r>
-              <a:rPr kumimoji="0" lang="en-US" sz="4400" b="0" i="0" u="none" strike="noStrike" kern="1200" cap="none" spc="0" normalizeH="0" baseline="0" noProof="0" dirty="0" smtClean="0">
+              <a:rPr kumimoji="0" lang="en-US" sz="4400" b="1" i="0" u="none" strike="noStrike" kern="1200" cap="none" spc="0" normalizeH="0" baseline="0" noProof="0" dirty="0" smtClean="0">
                 <a:ln>
                   <a:noFill/>
                 </a:ln>
@@ -3817,9 +3746,26 @@
                 <a:ea typeface="+mj-ea"/>
                 <a:cs typeface="+mj-cs"/>
               </a:rPr>
-              <a:t>Class Diagrams</a:t>
-            </a:r>
-            <a:endParaRPr kumimoji="0" lang="en-US" sz="4400" b="0" i="0" u="none" strike="noStrike" kern="1200" cap="none" spc="0" normalizeH="0" baseline="0" noProof="0" dirty="0">
+              <a:t>Class </a:t>
+            </a:r>
+            <a:r>
+              <a:rPr kumimoji="0" lang="en-US" sz="4400" b="1" i="0" u="none" strike="noStrike" kern="1200" cap="none" spc="0" normalizeH="0" baseline="0" noProof="0" dirty="0" smtClean="0">
+                <a:ln>
+                  <a:noFill/>
+                </a:ln>
+                <a:solidFill>
+                  <a:schemeClr val="tx1"/>
+                </a:solidFill>
+                <a:effectLst/>
+                <a:uLnTx/>
+                <a:uFillTx/>
+                <a:latin typeface="+mj-lt"/>
+                <a:ea typeface="+mj-ea"/>
+                <a:cs typeface="+mj-cs"/>
+              </a:rPr>
+              <a:t>Diagrams</a:t>
+            </a:r>
+            <a:endParaRPr kumimoji="0" lang="en-US" sz="4400" b="1" i="0" u="none" strike="noStrike" kern="1200" cap="none" spc="0" normalizeH="0" baseline="0" noProof="0" dirty="0">
               <a:ln>
                 <a:noFill/>
               </a:ln>
@@ -3839,7 +3785,7 @@
     </p:spTree>
     <p:extLst>
       <p:ext uri="{BB962C8B-B14F-4D97-AF65-F5344CB8AC3E}">
-        <p14:creationId xmlns:p14="http://schemas.microsoft.com/office/powerpoint/2010/main" xmlns="" val="3260999506"/>
+        <p14:creationId xmlns:p14="http://schemas.microsoft.com/office/powerpoint/2010/main" val="3260999506"/>
       </p:ext>
     </p:extLst>
   </p:cSld>
@@ -3889,22 +3835,18 @@
           <a:lstStyle/>
           <a:p>
             <a:r>
-              <a:rPr lang="en-US" dirty="0">
-                <a:solidFill>
-                  <a:srgbClr val="FF0000"/>
-                </a:solidFill>
-              </a:rPr>
-              <a:t>Ariel</a:t>
-            </a:r>
-            <a:r>
-              <a:rPr lang="en-US" dirty="0"/>
-              <a:t> Selected </a:t>
-            </a:r>
-            <a:r>
-              <a:rPr lang="en-US" dirty="0" smtClean="0"/>
-              <a:t>Sequence Diagram 2</a:t>
-            </a:r>
-            <a:endParaRPr lang="en-US" dirty="0"/>
+              <a:rPr lang="en-US" b="1" dirty="0" smtClean="0"/>
+              <a:t>Selected </a:t>
+            </a:r>
+            <a:r>
+              <a:rPr lang="en-US" b="1" dirty="0" smtClean="0"/>
+              <a:t>Sequence Diagram </a:t>
+            </a:r>
+            <a:r>
+              <a:rPr lang="en-US" b="1" dirty="0" smtClean="0"/>
+              <a:t>1</a:t>
+            </a:r>
+            <a:endParaRPr lang="en-US" b="1" dirty="0"/>
           </a:p>
         </p:txBody>
       </p:sp>
@@ -3934,7 +3876,7 @@
     </p:spTree>
     <p:extLst>
       <p:ext uri="{BB962C8B-B14F-4D97-AF65-F5344CB8AC3E}">
-        <p14:creationId xmlns:p14="http://schemas.microsoft.com/office/powerpoint/2010/main" xmlns="" val="560217405"/>
+        <p14:creationId xmlns:p14="http://schemas.microsoft.com/office/powerpoint/2010/main" val="560217405"/>
       </p:ext>
     </p:extLst>
   </p:cSld>
@@ -3984,22 +3926,14 @@
           <a:lstStyle/>
           <a:p>
             <a:r>
-              <a:rPr lang="en-US" dirty="0">
-                <a:solidFill>
-                  <a:srgbClr val="FF0000"/>
-                </a:solidFill>
-              </a:rPr>
-              <a:t>Ariel</a:t>
-            </a:r>
-            <a:r>
-              <a:rPr lang="en-US" dirty="0"/>
-              <a:t> Selected </a:t>
-            </a:r>
-            <a:r>
-              <a:rPr lang="en-US" dirty="0" smtClean="0"/>
+              <a:rPr lang="en-US" b="1" dirty="0" smtClean="0"/>
+              <a:t>Selected </a:t>
+            </a:r>
+            <a:r>
+              <a:rPr lang="en-US" b="1" dirty="0" smtClean="0"/>
               <a:t>Sequence Diagram 2</a:t>
             </a:r>
-            <a:endParaRPr lang="en-US" dirty="0"/>
+            <a:endParaRPr lang="en-US" b="1" dirty="0"/>
           </a:p>
         </p:txBody>
       </p:sp>
@@ -4029,7 +3963,7 @@
     </p:spTree>
     <p:extLst>
       <p:ext uri="{BB962C8B-B14F-4D97-AF65-F5344CB8AC3E}">
-        <p14:creationId xmlns:p14="http://schemas.microsoft.com/office/powerpoint/2010/main" xmlns="" val="560217405"/>
+        <p14:creationId xmlns:p14="http://schemas.microsoft.com/office/powerpoint/2010/main" val="560217405"/>
       </p:ext>
     </p:extLst>
   </p:cSld>
@@ -4079,18 +4013,10 @@
           <a:lstStyle/>
           <a:p>
             <a:r>
-              <a:rPr lang="en-US" dirty="0" smtClean="0">
-                <a:solidFill>
-                  <a:srgbClr val="FF0000"/>
-                </a:solidFill>
-              </a:rPr>
-              <a:t>Roger </a:t>
-            </a:r>
-            <a:r>
-              <a:rPr lang="en-US" dirty="0" smtClean="0"/>
+              <a:rPr lang="en-US" b="1" dirty="0" smtClean="0"/>
               <a:t>Summary</a:t>
             </a:r>
-            <a:endParaRPr lang="en-US" dirty="0"/>
+            <a:endParaRPr lang="en-US" b="1" dirty="0"/>
           </a:p>
         </p:txBody>
       </p:sp>
@@ -4156,7 +4082,7 @@
     </p:spTree>
     <p:extLst>
       <p:ext uri="{BB962C8B-B14F-4D97-AF65-F5344CB8AC3E}">
-        <p14:creationId xmlns:p14="http://schemas.microsoft.com/office/powerpoint/2010/main" xmlns="" val="650407036"/>
+        <p14:creationId xmlns:p14="http://schemas.microsoft.com/office/powerpoint/2010/main" val="650407036"/>
       </p:ext>
     </p:extLst>
   </p:cSld>
@@ -4206,22 +4132,14 @@
           <a:lstStyle/>
           <a:p>
             <a:r>
-              <a:rPr lang="en-US" dirty="0">
-                <a:solidFill>
-                  <a:srgbClr val="FF0000"/>
-                </a:solidFill>
-              </a:rPr>
-              <a:t>Johann</a:t>
-            </a:r>
-            <a:r>
-              <a:rPr lang="en-US" dirty="0"/>
-              <a:t> </a:t>
-            </a:r>
-            <a:r>
-              <a:rPr lang="en-US" dirty="0" smtClean="0"/>
-              <a:t>Brief Introduction</a:t>
-            </a:r>
-            <a:endParaRPr lang="en-US" dirty="0"/>
+              <a:rPr lang="en-US" b="1" dirty="0" smtClean="0"/>
+              <a:t>Brief </a:t>
+            </a:r>
+            <a:r>
+              <a:rPr lang="en-US" b="1" dirty="0" smtClean="0"/>
+              <a:t>Introduction</a:t>
+            </a:r>
+            <a:endParaRPr lang="en-US" b="1" dirty="0"/>
           </a:p>
         </p:txBody>
       </p:sp>
@@ -4260,7 +4178,11 @@
             </a:r>
             <a:r>
               <a:rPr lang="en-US" dirty="0"/>
-              <a:t>system that they wish to call "Sunshine Online Car Dealer Inc.". </a:t>
+              <a:t>system that they wish to call "Sunshine Online Car </a:t>
+            </a:r>
+            <a:r>
+              <a:rPr lang="en-US" dirty="0" smtClean="0"/>
+              <a:t>Dealer System". </a:t>
             </a:r>
             <a:endParaRPr lang="en-US" dirty="0" smtClean="0"/>
           </a:p>
@@ -4312,7 +4234,7 @@
     </p:spTree>
     <p:extLst>
       <p:ext uri="{BB962C8B-B14F-4D97-AF65-F5344CB8AC3E}">
-        <p14:creationId xmlns:p14="http://schemas.microsoft.com/office/powerpoint/2010/main" xmlns="" val="1904782738"/>
+        <p14:creationId xmlns:p14="http://schemas.microsoft.com/office/powerpoint/2010/main" val="1904782738"/>
       </p:ext>
     </p:extLst>
   </p:cSld>
@@ -4352,27 +4274,19 @@
         <p:spPr/>
         <p:txBody>
           <a:bodyPr>
-            <a:normAutofit fontScale="90000"/>
+            <a:normAutofit/>
           </a:bodyPr>
           <a:lstStyle/>
           <a:p>
             <a:r>
-              <a:rPr lang="en-US" dirty="0">
-                <a:solidFill>
-                  <a:srgbClr val="FF0000"/>
-                </a:solidFill>
-              </a:rPr>
-              <a:t>Johann</a:t>
-            </a:r>
-            <a:r>
-              <a:rPr lang="en-US" dirty="0"/>
-              <a:t> Nonfunctional </a:t>
-            </a:r>
-            <a:r>
-              <a:rPr lang="en-US" dirty="0" smtClean="0"/>
+              <a:rPr lang="en-US" b="1" dirty="0" smtClean="0"/>
+              <a:t>Nonfunctional </a:t>
+            </a:r>
+            <a:r>
+              <a:rPr lang="en-US" b="1" dirty="0" smtClean="0"/>
               <a:t>requirements</a:t>
             </a:r>
-            <a:endParaRPr lang="en-US" dirty="0"/>
+            <a:endParaRPr lang="en-US" b="1" dirty="0"/>
           </a:p>
         </p:txBody>
       </p:sp>
@@ -4386,7 +4300,12 @@
             <p:ph idx="1"/>
           </p:nvPr>
         </p:nvSpPr>
-        <p:spPr/>
+        <p:spPr>
+          <a:xfrm>
+            <a:off x="457200" y="1600200"/>
+            <a:ext cx="8229600" cy="4953000"/>
+          </a:xfrm>
+        </p:spPr>
         <p:txBody>
           <a:bodyPr>
             <a:normAutofit fontScale="47500" lnSpcReduction="20000"/>
@@ -4413,11 +4332,15 @@
             </a:pPr>
             <a:r>
               <a:rPr lang="en-US" dirty="0" smtClean="0"/>
-              <a:t>The SOCD (Sunshine Online Car Dealer) </a:t>
-            </a:r>
-            <a:r>
-              <a:rPr lang="en-US" dirty="0" smtClean="0"/>
-              <a:t>will sell vehicles online to user. </a:t>
+              <a:t>The </a:t>
+            </a:r>
+            <a:r>
+              <a:rPr lang="en-US" dirty="0"/>
+              <a:t>Sunshine Online Car Dealer System will </a:t>
+            </a:r>
+            <a:r>
+              <a:rPr lang="en-US" dirty="0" smtClean="0"/>
+              <a:t>sell vehicles online to user. </a:t>
             </a:r>
           </a:p>
           <a:p>
@@ -4428,23 +4351,7 @@
             </a:pPr>
             <a:r>
               <a:rPr lang="en-US" dirty="0" smtClean="0"/>
-              <a:t>The sel</a:t>
-            </a:r>
-            <a:r>
-              <a:rPr lang="en-US" dirty="0" smtClean="0"/>
-              <a:t>l process will occurred</a:t>
-            </a:r>
-            <a:r>
-              <a:rPr lang="en-US" dirty="0" smtClean="0"/>
-              <a:t> unattended from human supervision </a:t>
-            </a:r>
-            <a:r>
-              <a:rPr lang="en-US" dirty="0" smtClean="0"/>
-              <a:t>until car is ready to be shipped</a:t>
-            </a:r>
-            <a:r>
-              <a:rPr lang="en-US" dirty="0" smtClean="0"/>
-              <a:t>.</a:t>
+              <a:t>The sell process will occurred unattended from human supervision until car is ready to be shipped.</a:t>
             </a:r>
           </a:p>
           <a:p>
@@ -4472,11 +4379,11 @@
             </a:pPr>
             <a:r>
               <a:rPr lang="en-US" dirty="0" smtClean="0"/>
-              <a:t>The SOCD </a:t>
-            </a:r>
-            <a:r>
-              <a:rPr lang="en-US" dirty="0" smtClean="0"/>
-              <a:t>will </a:t>
+              <a:t>The </a:t>
+            </a:r>
+            <a:r>
+              <a:rPr lang="en-US" dirty="0"/>
+              <a:t>Sunshine Online Car Dealer System will </a:t>
             </a:r>
             <a:r>
               <a:rPr lang="en-US" dirty="0" smtClean="0"/>
@@ -4501,26 +4408,37 @@
             </a:pPr>
             <a:r>
               <a:rPr lang="en-US" dirty="0" smtClean="0"/>
-              <a:t>The system will be a secure reliable source to make a vehicle </a:t>
-            </a:r>
-            <a:r>
-              <a:rPr lang="en-US" dirty="0" smtClean="0"/>
-              <a:t>purchase.</a:t>
-            </a:r>
-            <a:endParaRPr lang="en-US" dirty="0" smtClean="0"/>
+              <a:t>The system will be a secure reliable source to make a vehicle purchase.</a:t>
+            </a:r>
           </a:p>
           <a:p>
             <a:pPr lvl="1"/>
             <a:r>
               <a:rPr lang="en-US" dirty="0" smtClean="0"/>
-              <a:t>The SOCD will not have an invalid input as all the input option will be provided for their selection.</a:t>
+              <a:t>The </a:t>
+            </a:r>
+            <a:r>
+              <a:rPr lang="en-US" dirty="0"/>
+              <a:t>Sunshine Online Car Dealer System will </a:t>
+            </a:r>
+            <a:r>
+              <a:rPr lang="en-US" dirty="0" smtClean="0"/>
+              <a:t>not have an invalid input as all the input option will be provided for their selection.</a:t>
             </a:r>
           </a:p>
           <a:p>
             <a:pPr lvl="1"/>
             <a:r>
               <a:rPr lang="en-US" dirty="0" smtClean="0"/>
-              <a:t>The SOCD will only provide for sale whatever is available in it’s inventory. </a:t>
+              <a:t>The </a:t>
+            </a:r>
+            <a:r>
+              <a:rPr lang="en-US" dirty="0"/>
+              <a:t>Sunshine Online Car Dealer System will </a:t>
+            </a:r>
+            <a:r>
+              <a:rPr lang="en-US" dirty="0" smtClean="0"/>
+              <a:t>only provide for sale whatever is available in it’s inventory. </a:t>
             </a:r>
           </a:p>
           <a:p>
@@ -4554,16 +4472,28 @@
             <a:pPr lvl="1"/>
             <a:r>
               <a:rPr lang="en-US" dirty="0" smtClean="0"/>
-              <a:t>Very portable since every device (i.e.: Smartphone or Tablet) with a browser will be able to access the SOCD.</a:t>
-            </a:r>
+              <a:t>Very portable since every device (i.e.: Smartphone or Tablet) with a browser will be able to access the </a:t>
+            </a:r>
+            <a:r>
+              <a:rPr lang="en-US" dirty="0"/>
+              <a:t>Sunshine Online Car Dealer System .</a:t>
+            </a:r>
+            <a:endParaRPr lang="en-US" dirty="0" smtClean="0"/>
           </a:p>
           <a:p>
             <a:pPr lvl="1"/>
             <a:r>
               <a:rPr lang="en-US" dirty="0" smtClean="0"/>
-              <a:t>The SOCD has been designed with Entity, Boundary and Control objects making the system more adaptable to maintainability, changes and support. </a:t>
-            </a:r>
-            <a:endParaRPr lang="en-US" dirty="0" smtClean="0"/>
+              <a:t>The </a:t>
+            </a:r>
+            <a:r>
+              <a:rPr lang="en-US" dirty="0"/>
+              <a:t>Sunshine Online Car Dealer System has </a:t>
+            </a:r>
+            <a:r>
+              <a:rPr lang="en-US" dirty="0" smtClean="0"/>
+              <a:t>been designed with Entity, Boundary and Control objects making the system more adaptable to maintainability, changes and support. </a:t>
+            </a:r>
           </a:p>
           <a:p>
             <a:endParaRPr lang="en-US" dirty="0"/>
@@ -4579,7 +4509,7 @@
     </p:spTree>
     <p:extLst>
       <p:ext uri="{BB962C8B-B14F-4D97-AF65-F5344CB8AC3E}">
-        <p14:creationId xmlns:p14="http://schemas.microsoft.com/office/powerpoint/2010/main" xmlns="" val="1366422554"/>
+        <p14:creationId xmlns:p14="http://schemas.microsoft.com/office/powerpoint/2010/main" val="1366422554"/>
       </p:ext>
     </p:extLst>
   </p:cSld>
@@ -4622,22 +4552,14 @@
           <a:lstStyle/>
           <a:p>
             <a:r>
-              <a:rPr lang="en-US" dirty="0">
-                <a:solidFill>
-                  <a:srgbClr val="FF0000"/>
-                </a:solidFill>
-              </a:rPr>
-              <a:t>Johann</a:t>
-            </a:r>
-            <a:r>
-              <a:rPr lang="en-US" dirty="0"/>
-              <a:t> Functional </a:t>
-            </a:r>
-            <a:r>
-              <a:rPr lang="en-US" dirty="0" smtClean="0"/>
+              <a:rPr lang="en-US" b="1" dirty="0" smtClean="0"/>
+              <a:t>Functional </a:t>
+            </a:r>
+            <a:r>
+              <a:rPr lang="en-US" b="1" dirty="0" smtClean="0"/>
               <a:t>Requirements</a:t>
             </a:r>
-            <a:endParaRPr lang="en-US" dirty="0"/>
+            <a:endParaRPr lang="en-US" b="1" dirty="0"/>
           </a:p>
         </p:txBody>
       </p:sp>
@@ -4894,7 +4816,7 @@
     </p:spTree>
     <p:extLst>
       <p:ext uri="{BB962C8B-B14F-4D97-AF65-F5344CB8AC3E}">
-        <p14:creationId xmlns:p14="http://schemas.microsoft.com/office/powerpoint/2010/main" xmlns="" val="1018291567"/>
+        <p14:creationId xmlns:p14="http://schemas.microsoft.com/office/powerpoint/2010/main" val="1018291567"/>
       </p:ext>
     </p:extLst>
   </p:cSld>
@@ -4937,22 +4859,14 @@
           <a:lstStyle/>
           <a:p>
             <a:r>
-              <a:rPr lang="en-US" dirty="0">
-                <a:solidFill>
-                  <a:srgbClr val="FF0000"/>
-                </a:solidFill>
-              </a:rPr>
-              <a:t>Johann</a:t>
-            </a:r>
-            <a:r>
-              <a:rPr lang="en-US" dirty="0"/>
-              <a:t> </a:t>
-            </a:r>
-            <a:r>
-              <a:rPr lang="en-US" dirty="0" smtClean="0"/>
-              <a:t>Functional Requirements</a:t>
-            </a:r>
-            <a:endParaRPr lang="en-US" dirty="0"/>
+              <a:rPr lang="en-US" b="1" dirty="0" smtClean="0"/>
+              <a:t>Functional </a:t>
+            </a:r>
+            <a:r>
+              <a:rPr lang="en-US" b="1" dirty="0" smtClean="0"/>
+              <a:t>Requirements</a:t>
+            </a:r>
+            <a:endParaRPr lang="en-US" b="1" dirty="0"/>
           </a:p>
         </p:txBody>
       </p:sp>
@@ -5218,7 +5132,7 @@
     </p:spTree>
     <p:extLst>
       <p:ext uri="{BB962C8B-B14F-4D97-AF65-F5344CB8AC3E}">
-        <p14:creationId xmlns:p14="http://schemas.microsoft.com/office/powerpoint/2010/main" xmlns="" val="2400752179"/>
+        <p14:creationId xmlns:p14="http://schemas.microsoft.com/office/powerpoint/2010/main" val="2400752179"/>
       </p:ext>
     </p:extLst>
   </p:cSld>
@@ -5261,22 +5175,10 @@
           <a:lstStyle/>
           <a:p>
             <a:r>
-              <a:rPr lang="en-US" dirty="0">
-                <a:solidFill>
-                  <a:srgbClr val="FF0000"/>
-                </a:solidFill>
-              </a:rPr>
-              <a:t>Johann</a:t>
-            </a:r>
-            <a:r>
-              <a:rPr lang="en-US" dirty="0"/>
-              <a:t> </a:t>
-            </a:r>
-            <a:r>
-              <a:rPr lang="en-US" dirty="0" smtClean="0"/>
+              <a:rPr lang="en-US" b="1" dirty="0" smtClean="0"/>
               <a:t>Constraints</a:t>
             </a:r>
-            <a:endParaRPr lang="en-US" dirty="0"/>
+            <a:endParaRPr lang="en-US" b="1" dirty="0"/>
           </a:p>
         </p:txBody>
       </p:sp>
@@ -5292,7 +5194,9 @@
         </p:nvSpPr>
         <p:spPr/>
         <p:txBody>
-          <a:bodyPr/>
+          <a:bodyPr>
+            <a:normAutofit lnSpcReduction="10000"/>
+          </a:bodyPr>
           <a:lstStyle/>
           <a:p>
             <a:r>
@@ -5319,8 +5223,12 @@
               </a:lnSpc>
             </a:pPr>
             <a:r>
-              <a:rPr lang="en-US" dirty="0" smtClean="0"/>
-              <a:t>SOCD must contain a </a:t>
+              <a:rPr lang="en-US" dirty="0"/>
+              <a:t>Sunshine Online Car Dealer System must </a:t>
+            </a:r>
+            <a:r>
+              <a:rPr lang="en-US" dirty="0" smtClean="0"/>
+              <a:t>contain a </a:t>
             </a:r>
             <a:r>
               <a:rPr lang="en-US" dirty="0" err="1" smtClean="0"/>
@@ -5328,15 +5236,7 @@
             </a:r>
             <a:r>
               <a:rPr lang="en-US" dirty="0" smtClean="0"/>
-              <a:t> </a:t>
-            </a:r>
-            <a:r>
-              <a:rPr lang="en-US" dirty="0" smtClean="0"/>
-              <a:t>database </a:t>
-            </a:r>
-            <a:r>
-              <a:rPr lang="en-US" dirty="0" smtClean="0"/>
-              <a:t> with at least one user as Administrator.</a:t>
+              <a:t> database  with at least one user as Administrator.</a:t>
             </a:r>
           </a:p>
           <a:p>
@@ -5369,7 +5269,15 @@
             </a:pPr>
             <a:r>
               <a:rPr lang="en-US" dirty="0" smtClean="0"/>
-              <a:t>The SOCD will sell cars with minimal human supervision.</a:t>
+              <a:t>The </a:t>
+            </a:r>
+            <a:r>
+              <a:rPr lang="en-US" dirty="0"/>
+              <a:t>Sunshine Online Car Dealer System will </a:t>
+            </a:r>
+            <a:r>
+              <a:rPr lang="en-US" dirty="0" smtClean="0"/>
+              <a:t>sell cars with minimal human supervision.</a:t>
             </a:r>
           </a:p>
           <a:p>
@@ -5392,7 +5300,7 @@
     </p:spTree>
     <p:extLst>
       <p:ext uri="{BB962C8B-B14F-4D97-AF65-F5344CB8AC3E}">
-        <p14:creationId xmlns:p14="http://schemas.microsoft.com/office/powerpoint/2010/main" xmlns="" val="1457262062"/>
+        <p14:creationId xmlns:p14="http://schemas.microsoft.com/office/powerpoint/2010/main" val="1457262062"/>
       </p:ext>
     </p:extLst>
   </p:cSld>
@@ -5435,18 +5343,14 @@
           <a:lstStyle/>
           <a:p>
             <a:r>
-              <a:rPr lang="en-US" dirty="0" smtClean="0">
-                <a:solidFill>
-                  <a:srgbClr val="FF0000"/>
-                </a:solidFill>
-              </a:rPr>
-              <a:t>Yang</a:t>
-            </a:r>
-            <a:r>
-              <a:rPr lang="en-US" dirty="0" smtClean="0"/>
-              <a:t> Selected Use Case 1</a:t>
-            </a:r>
-            <a:endParaRPr lang="en-US" dirty="0"/>
+              <a:rPr lang="en-US" b="1" dirty="0" smtClean="0"/>
+              <a:t>Selected </a:t>
+            </a:r>
+            <a:r>
+              <a:rPr lang="en-US" b="1" dirty="0" smtClean="0"/>
+              <a:t>Use Case 1</a:t>
+            </a:r>
+            <a:endParaRPr lang="en-US" b="1" dirty="0"/>
           </a:p>
         </p:txBody>
       </p:sp>
@@ -5513,15 +5417,37 @@
             <a:pPr lvl="1"/>
             <a:r>
               <a:rPr lang="en-US" dirty="0" smtClean="0"/>
-              <a:t>User/Admin input username </a:t>
-            </a:r>
-            <a:r>
-              <a:rPr lang="en-US" dirty="0" smtClean="0"/>
-              <a:t>and password into </a:t>
-            </a:r>
-            <a:r>
-              <a:rPr lang="en-US" dirty="0" smtClean="0"/>
-              <a:t>the Login web page</a:t>
+              <a:t>User/Admin input username and password into the Login web page.</a:t>
+            </a:r>
+          </a:p>
+          <a:p>
+            <a:pPr lvl="1"/>
+            <a:r>
+              <a:rPr lang="en-US" dirty="0" smtClean="0"/>
+              <a:t> The Online Car Dealer System </a:t>
+            </a:r>
+            <a:r>
+              <a:rPr lang="en-US" dirty="0"/>
+              <a:t>match username/password entered with list of stored </a:t>
+            </a:r>
+            <a:r>
+              <a:rPr lang="en-US" dirty="0" smtClean="0"/>
+              <a:t>users/admin.</a:t>
+            </a:r>
+          </a:p>
+          <a:p>
+            <a:pPr lvl="1"/>
+            <a:r>
+              <a:rPr lang="en-US" dirty="0"/>
+              <a:t>The </a:t>
+            </a:r>
+            <a:r>
+              <a:rPr lang="en-US" dirty="0" smtClean="0"/>
+              <a:t>Online Car Dealer System logs User/Admin</a:t>
+            </a:r>
+            <a:r>
+              <a:rPr lang="en-US" dirty="0"/>
+              <a:t> into the system</a:t>
             </a:r>
             <a:r>
               <a:rPr lang="en-US" dirty="0" smtClean="0"/>
@@ -5532,127 +5458,83 @@
             <a:pPr lvl="1"/>
             <a:r>
               <a:rPr lang="en-US" dirty="0" smtClean="0"/>
-              <a:t> The </a:t>
-            </a:r>
-            <a:r>
-              <a:rPr lang="en-US" dirty="0" smtClean="0"/>
-              <a:t>Online Car Dealer System </a:t>
-            </a:r>
-            <a:r>
-              <a:rPr lang="en-US" dirty="0"/>
-              <a:t>match username/password entered with list of stored </a:t>
-            </a:r>
-            <a:r>
-              <a:rPr lang="en-US" dirty="0" smtClean="0"/>
-              <a:t>users/admin.</a:t>
+              <a:t>User/Admin </a:t>
+            </a:r>
+            <a:r>
+              <a:rPr lang="en-US" dirty="0"/>
+              <a:t> are </a:t>
+            </a:r>
+            <a:r>
+              <a:rPr lang="en-US" dirty="0" smtClean="0"/>
+              <a:t>redirected </a:t>
+            </a:r>
+            <a:r>
+              <a:rPr lang="en-US" dirty="0"/>
+              <a:t>to home/index </a:t>
+            </a:r>
+            <a:r>
+              <a:rPr lang="en-US" dirty="0" smtClean="0"/>
+              <a:t>web </a:t>
+            </a:r>
+            <a:r>
+              <a:rPr lang="en-US" dirty="0"/>
+              <a:t>page </a:t>
+            </a:r>
+            <a:r>
+              <a:rPr lang="en-US" dirty="0" smtClean="0"/>
+              <a:t>or into the requested page showing </a:t>
+            </a:r>
+            <a:r>
+              <a:rPr lang="en-US" dirty="0"/>
+              <a:t>a logged in status.</a:t>
+            </a:r>
+            <a:endParaRPr lang="en-US" dirty="0" smtClean="0"/>
+          </a:p>
+          <a:p>
+            <a:r>
+              <a:rPr lang="en-US" dirty="0" smtClean="0"/>
+              <a:t>Exit Condition: User/Admin</a:t>
+            </a:r>
+            <a:r>
+              <a:rPr lang="en-US" dirty="0"/>
+              <a:t> is logged into </a:t>
+            </a:r>
+            <a:r>
+              <a:rPr lang="en-US" dirty="0" smtClean="0"/>
+              <a:t>the Online Car Dealer System.</a:t>
+            </a:r>
+          </a:p>
+          <a:p>
+            <a:r>
+              <a:rPr lang="en-US" dirty="0" smtClean="0"/>
+              <a:t>Exceptions: </a:t>
             </a:r>
           </a:p>
           <a:p>
             <a:pPr lvl="1"/>
             <a:r>
-              <a:rPr lang="en-US" dirty="0"/>
-              <a:t>The </a:t>
-            </a:r>
-            <a:r>
-              <a:rPr lang="en-US" dirty="0" smtClean="0"/>
-              <a:t>Online Car Dealer System logs User/Admin</a:t>
-            </a:r>
-            <a:r>
-              <a:rPr lang="en-US" dirty="0"/>
-              <a:t> into the system</a:t>
-            </a:r>
-            <a:r>
-              <a:rPr lang="en-US" dirty="0" smtClean="0"/>
-              <a:t>.</a:t>
+              <a:rPr lang="en-US" dirty="0" smtClean="0"/>
+              <a:t>Cancel</a:t>
             </a:r>
           </a:p>
           <a:p>
             <a:pPr lvl="1"/>
             <a:r>
               <a:rPr lang="en-US" dirty="0" smtClean="0"/>
-              <a:t>User/Admin </a:t>
-            </a:r>
-            <a:r>
-              <a:rPr lang="en-US" dirty="0"/>
-              <a:t> are </a:t>
-            </a:r>
-            <a:r>
-              <a:rPr lang="en-US" dirty="0" smtClean="0"/>
-              <a:t>redirected </a:t>
-            </a:r>
-            <a:r>
-              <a:rPr lang="en-US" dirty="0"/>
-              <a:t>to home/index </a:t>
-            </a:r>
-            <a:r>
-              <a:rPr lang="en-US" dirty="0" smtClean="0"/>
-              <a:t>web </a:t>
-            </a:r>
-            <a:r>
-              <a:rPr lang="en-US" dirty="0"/>
-              <a:t>page </a:t>
-            </a:r>
-            <a:r>
-              <a:rPr lang="en-US" dirty="0" smtClean="0"/>
-              <a:t>or into the requested page showing </a:t>
-            </a:r>
-            <a:r>
-              <a:rPr lang="en-US" dirty="0"/>
-              <a:t>a logged in status.</a:t>
+              <a:t>“Wrong Username/Password”</a:t>
+            </a:r>
+          </a:p>
+          <a:p>
+            <a:pPr lvl="1"/>
+            <a:r>
+              <a:rPr lang="en-US" dirty="0" smtClean="0"/>
+              <a:t>“No connectivity</a:t>
+            </a:r>
+            <a:r>
+              <a:rPr lang="en-US" dirty="0" smtClean="0"/>
+              <a:t>”</a:t>
             </a:r>
             <a:endParaRPr lang="en-US" dirty="0" smtClean="0"/>
-          </a:p>
-          <a:p>
-            <a:r>
-              <a:rPr lang="en-US" dirty="0" smtClean="0"/>
-              <a:t>Exit Condition: User/Admin</a:t>
-            </a:r>
-            <a:r>
-              <a:rPr lang="en-US" dirty="0"/>
-              <a:t> is logged into </a:t>
-            </a:r>
-            <a:r>
-              <a:rPr lang="en-US" dirty="0" smtClean="0"/>
-              <a:t>the Online Car Dealer System.</a:t>
-            </a:r>
-          </a:p>
-          <a:p>
-            <a:r>
-              <a:rPr lang="en-US" dirty="0" smtClean="0"/>
-              <a:t>Exceptions: </a:t>
-            </a:r>
-          </a:p>
-          <a:p>
-            <a:pPr lvl="1"/>
-            <a:r>
-              <a:rPr lang="en-US" dirty="0" smtClean="0"/>
-              <a:t>Cancel</a:t>
-            </a:r>
-          </a:p>
-          <a:p>
-            <a:pPr lvl="1"/>
-            <a:r>
-              <a:rPr lang="en-US" dirty="0" smtClean="0"/>
-              <a:t>“Wrong Username/Password</a:t>
-            </a:r>
-            <a:r>
-              <a:rPr lang="en-US" dirty="0" smtClean="0"/>
-              <a:t>”</a:t>
-            </a:r>
-          </a:p>
-          <a:p>
-            <a:pPr lvl="1"/>
-            <a:r>
-              <a:rPr lang="en-US" dirty="0" smtClean="0"/>
-              <a:t>“No connectivity”</a:t>
-            </a:r>
-            <a:endParaRPr lang="en-US" dirty="0" smtClean="0"/>
-          </a:p>
-          <a:p>
-            <a:r>
-              <a:rPr lang="en-US" dirty="0" smtClean="0"/>
-              <a:t>Special Requirements: </a:t>
-            </a:r>
           </a:p>
           <a:p>
             <a:pPr marL="0" indent="0">
@@ -5665,7 +5547,7 @@
     </p:spTree>
     <p:extLst>
       <p:ext uri="{BB962C8B-B14F-4D97-AF65-F5344CB8AC3E}">
-        <p14:creationId xmlns:p14="http://schemas.microsoft.com/office/powerpoint/2010/main" xmlns="" val="2554732056"/>
+        <p14:creationId xmlns:p14="http://schemas.microsoft.com/office/powerpoint/2010/main" val="2554732056"/>
       </p:ext>
     </p:extLst>
   </p:cSld>
@@ -5708,22 +5590,14 @@
           <a:lstStyle/>
           <a:p>
             <a:r>
-              <a:rPr lang="en-US" dirty="0">
-                <a:solidFill>
-                  <a:srgbClr val="FF0000"/>
-                </a:solidFill>
-              </a:rPr>
-              <a:t>Yang</a:t>
-            </a:r>
-            <a:r>
-              <a:rPr lang="en-US" dirty="0"/>
-              <a:t> Selected </a:t>
-            </a:r>
-            <a:r>
-              <a:rPr lang="en-US" dirty="0" smtClean="0"/>
+              <a:rPr lang="en-US" b="1" dirty="0" smtClean="0"/>
+              <a:t>Selected </a:t>
+            </a:r>
+            <a:r>
+              <a:rPr lang="en-US" b="1" dirty="0" smtClean="0"/>
               <a:t>Use Case 2</a:t>
             </a:r>
-            <a:endParaRPr lang="en-US" dirty="0"/>
+            <a:endParaRPr lang="en-US" b="1" dirty="0"/>
           </a:p>
         </p:txBody>
       </p:sp>
@@ -5911,11 +5785,7 @@
             <a:pPr lvl="1"/>
             <a:r>
               <a:rPr lang="en-US" dirty="0" smtClean="0"/>
-              <a:t>Invalid Credit Card </a:t>
-            </a:r>
-            <a:r>
-              <a:rPr lang="en-US" dirty="0" smtClean="0"/>
-              <a:t>Information</a:t>
+              <a:t>Invalid Credit Card Information</a:t>
             </a:r>
           </a:p>
           <a:p>
@@ -5924,7 +5794,6 @@
               <a:rPr lang="en-US" dirty="0" smtClean="0"/>
               <a:t>Sold to another faster customer</a:t>
             </a:r>
-            <a:endParaRPr lang="en-US" dirty="0" smtClean="0"/>
           </a:p>
           <a:p>
             <a:r>
@@ -5949,7 +5818,7 @@
     </p:spTree>
     <p:extLst>
       <p:ext uri="{BB962C8B-B14F-4D97-AF65-F5344CB8AC3E}">
-        <p14:creationId xmlns:p14="http://schemas.microsoft.com/office/powerpoint/2010/main" xmlns="" val="3930061998"/>
+        <p14:creationId xmlns:p14="http://schemas.microsoft.com/office/powerpoint/2010/main" val="3930061998"/>
       </p:ext>
     </p:extLst>
   </p:cSld>
@@ -5992,22 +5861,14 @@
           <a:lstStyle/>
           <a:p>
             <a:r>
-              <a:rPr lang="en-US" dirty="0">
-                <a:solidFill>
-                  <a:srgbClr val="FF0000"/>
-                </a:solidFill>
-              </a:rPr>
-              <a:t>Yang</a:t>
-            </a:r>
-            <a:r>
-              <a:rPr lang="en-US" dirty="0"/>
-              <a:t> Selected </a:t>
-            </a:r>
-            <a:r>
-              <a:rPr lang="en-US" dirty="0" smtClean="0"/>
+              <a:rPr lang="en-US" b="1" dirty="0" smtClean="0"/>
+              <a:t>Selected </a:t>
+            </a:r>
+            <a:r>
+              <a:rPr lang="en-US" b="1" dirty="0" smtClean="0"/>
               <a:t>Use Case 3</a:t>
             </a:r>
-            <a:endParaRPr lang="en-US" dirty="0"/>
+            <a:endParaRPr lang="en-US" b="1" dirty="0"/>
           </a:p>
         </p:txBody>
       </p:sp>
@@ -6075,13 +5936,8 @@
           <a:p>
             <a:r>
               <a:rPr lang="en-US" dirty="0" smtClean="0"/>
-              <a:t>Exit Condition: </a:t>
-            </a:r>
-            <a:r>
-              <a:rPr lang="en-US" dirty="0" smtClean="0"/>
-              <a:t>A new Admin User is created in the system</a:t>
-            </a:r>
-            <a:endParaRPr lang="en-US" dirty="0" smtClean="0"/>
+              <a:t>Exit Condition: A new Admin User is created in the system</a:t>
+            </a:r>
           </a:p>
           <a:p>
             <a:r>
@@ -6100,15 +5956,7 @@
             <a:pPr lvl="1"/>
             <a:r>
               <a:rPr lang="en-US" dirty="0" smtClean="0"/>
-              <a:t>“</a:t>
-            </a:r>
-            <a:r>
-              <a:rPr lang="en-US" dirty="0" smtClean="0"/>
-              <a:t>Username </a:t>
-            </a:r>
-            <a:r>
-              <a:rPr lang="en-US" dirty="0" smtClean="0"/>
-              <a:t>already exist”</a:t>
+              <a:t>“Username already exist”</a:t>
             </a:r>
           </a:p>
           <a:p>
@@ -6123,7 +5971,7 @@
     </p:spTree>
     <p:extLst>
       <p:ext uri="{BB962C8B-B14F-4D97-AF65-F5344CB8AC3E}">
-        <p14:creationId xmlns:p14="http://schemas.microsoft.com/office/powerpoint/2010/main" xmlns="" val="3369059010"/>
+        <p14:creationId xmlns:p14="http://schemas.microsoft.com/office/powerpoint/2010/main" val="3369059010"/>
       </p:ext>
     </p:extLst>
   </p:cSld>

</xml_diff>